<commit_message>
Added version 29 with 2 working buttons
Please write a testbench for the top game
</commit_message>
<xml_diff>
--- a/Bringing the Analog World to Digital Design_EC551_Final Project.pptx
+++ b/Bringing the Analog World to Digital Design_EC551_Final Project.pptx
@@ -2621,7 +2621,7 @@
           </a:ln>
           <a:extLst>
             <a:ext uri="{C572A759-6A51-4108-AA02-DFA0A04FC94B}">
-              <ma14:wrappingTextBoxFlag xmlns:ma14="http://schemas.microsoft.com/office/mac/drawingml/2011/main" xmlns:a14="http://schemas.microsoft.com/office/drawing/2010/main" xmlns:m="http://schemas.openxmlformats.org/officeDocument/2006/math" xmlns="" val="1"/>
+              <ma14:wrappingTextBoxFlag xmlns="" xmlns:m="http://schemas.openxmlformats.org/officeDocument/2006/math" xmlns:a14="http://schemas.microsoft.com/office/drawing/2010/main" xmlns:ma14="http://schemas.microsoft.com/office/mac/drawingml/2011/main" val="1"/>
             </a:ext>
           </a:extLst>
         </p:spPr>
@@ -2660,7 +2660,7 @@
           </a:ln>
           <a:extLst>
             <a:ext uri="{C572A759-6A51-4108-AA02-DFA0A04FC94B}">
-              <ma14:wrappingTextBoxFlag xmlns:ma14="http://schemas.microsoft.com/office/mac/drawingml/2011/main" xmlns:a14="http://schemas.microsoft.com/office/drawing/2010/main" xmlns:m="http://schemas.openxmlformats.org/officeDocument/2006/math" xmlns="" val="1"/>
+              <ma14:wrappingTextBoxFlag xmlns="" xmlns:m="http://schemas.openxmlformats.org/officeDocument/2006/math" xmlns:a14="http://schemas.microsoft.com/office/drawing/2010/main" xmlns:ma14="http://schemas.microsoft.com/office/mac/drawingml/2011/main" val="1"/>
             </a:ext>
           </a:extLst>
         </p:spPr>

</xml_diff>

<commit_message>
Updated final presentation with notes from in class presentation
</commit_message>
<xml_diff>
--- a/Bringing the Analog World to Digital Design_EC551_Final Project.pptx
+++ b/Bringing the Analog World to Digital Design_EC551_Final Project.pptx
@@ -2621,7 +2621,7 @@
           </a:ln>
           <a:extLst>
             <a:ext uri="{C572A759-6A51-4108-AA02-DFA0A04FC94B}">
-              <ma14:wrappingTextBoxFlag xmlns="" xmlns:m="http://schemas.openxmlformats.org/officeDocument/2006/math" xmlns:a14="http://schemas.microsoft.com/office/drawing/2010/main" xmlns:ma14="http://schemas.microsoft.com/office/mac/drawingml/2011/main" val="1"/>
+              <ma14:wrappingTextBoxFlag xmlns:ma14="http://schemas.microsoft.com/office/mac/drawingml/2011/main" xmlns:a14="http://schemas.microsoft.com/office/drawing/2010/main" xmlns:m="http://schemas.openxmlformats.org/officeDocument/2006/math" xmlns="" val="1"/>
             </a:ext>
           </a:extLst>
         </p:spPr>
@@ -2660,7 +2660,7 @@
           </a:ln>
           <a:extLst>
             <a:ext uri="{C572A759-6A51-4108-AA02-DFA0A04FC94B}">
-              <ma14:wrappingTextBoxFlag xmlns="" xmlns:m="http://schemas.openxmlformats.org/officeDocument/2006/math" xmlns:a14="http://schemas.microsoft.com/office/drawing/2010/main" xmlns:ma14="http://schemas.microsoft.com/office/mac/drawingml/2011/main" val="1"/>
+              <ma14:wrappingTextBoxFlag xmlns:ma14="http://schemas.microsoft.com/office/mac/drawingml/2011/main" xmlns:a14="http://schemas.microsoft.com/office/drawing/2010/main" xmlns:m="http://schemas.openxmlformats.org/officeDocument/2006/math" xmlns="" val="1"/>
             </a:ext>
           </a:extLst>
         </p:spPr>
@@ -3718,7 +3718,17 @@
           <a:bodyPr/>
           <a:lstStyle/>
           <a:p>
-            <a:endParaRPr lang="en-US"/>
+            <a:r>
+              <a:rPr lang="en-US" dirty="0"/>
+              <a:t>Analog game</a:t>
+            </a:r>
+          </a:p>
+          <a:p>
+            <a:pPr lvl="1"/>
+            <a:r>
+              <a:rPr lang="en-US" dirty="0"/>
+              <a:t>Pressing harder makes it move faster</a:t>
+            </a:r>
           </a:p>
         </p:txBody>
       </p:sp>
@@ -3805,6 +3815,12 @@
             <a:r>
               <a:rPr lang="en-US" dirty="0"/>
               <a:t>Use of Quad SPI flash memory</a:t>
+            </a:r>
+          </a:p>
+          <a:p>
+            <a:r>
+              <a:rPr lang="en-US" dirty="0"/>
+              <a:t>Timing issues of direction change versus ADC settling</a:t>
             </a:r>
           </a:p>
         </p:txBody>
@@ -4459,7 +4475,29 @@
           <a:bodyPr/>
           <a:lstStyle/>
           <a:p>
-            <a:endParaRPr lang="en-US"/>
+            <a:r>
+              <a:rPr lang="en-US" dirty="0"/>
+              <a:t>Describe game, rules</a:t>
+            </a:r>
+          </a:p>
+          <a:p>
+            <a:r>
+              <a:rPr lang="en-US" dirty="0"/>
+              <a:t>Balloons speed up after certain number of points</a:t>
+            </a:r>
+          </a:p>
+          <a:p>
+            <a:r>
+              <a:rPr lang="en-US" dirty="0"/>
+              <a:t>Additional </a:t>
+            </a:r>
+            <a:r>
+              <a:rPr lang="en-US"/>
+              <a:t>balloons coming in</a:t>
+            </a:r>
+          </a:p>
+          <a:p>
+            <a:endParaRPr lang="en-US" dirty="0"/>
           </a:p>
         </p:txBody>
       </p:sp>
@@ -4996,7 +5034,7 @@
           <a:p>
             <a:r>
               <a:rPr lang="en-US" dirty="0"/>
-              <a:t>Detailed Block Diagram</a:t>
+              <a:t>Detailed Block Diagram [Bin]</a:t>
             </a:r>
           </a:p>
         </p:txBody>
@@ -5080,7 +5118,7 @@
           <a:p>
             <a:r>
               <a:rPr lang="en-US" dirty="0"/>
-              <a:t>Verilog Example</a:t>
+              <a:t>Verilog Example [Conor]</a:t>
             </a:r>
           </a:p>
         </p:txBody>
@@ -5106,7 +5144,16 @@
           <a:bodyPr/>
           <a:lstStyle/>
           <a:p>
-            <a:endParaRPr lang="en-US"/>
+            <a:r>
+              <a:rPr lang="en-US" dirty="0"/>
+              <a:t>ADC instantiation</a:t>
+            </a:r>
+          </a:p>
+          <a:p>
+            <a:r>
+              <a:rPr lang="en-US" dirty="0"/>
+              <a:t>Explain DRP connection</a:t>
+            </a:r>
           </a:p>
         </p:txBody>
       </p:sp>

</xml_diff>

<commit_message>
Additional notes from in class presentations
</commit_message>
<xml_diff>
--- a/Bringing the Analog World to Digital Design_EC551_Final Project.pptx
+++ b/Bringing the Analog World to Digital Design_EC551_Final Project.pptx
@@ -5,7 +5,7 @@
     <p:sldMasterId id="2147483648" r:id="rId1"/>
   </p:sldMasterIdLst>
   <p:notesMasterIdLst>
-    <p:notesMasterId r:id="rId16"/>
+    <p:notesMasterId r:id="rId17"/>
   </p:notesMasterIdLst>
   <p:sldIdLst>
     <p:sldId id="256" r:id="rId2"/>
@@ -19,9 +19,10 @@
     <p:sldId id="278" r:id="rId10"/>
     <p:sldId id="279" r:id="rId11"/>
     <p:sldId id="280" r:id="rId12"/>
-    <p:sldId id="283" r:id="rId13"/>
-    <p:sldId id="268" r:id="rId14"/>
-    <p:sldId id="258" r:id="rId15"/>
+    <p:sldId id="284" r:id="rId13"/>
+    <p:sldId id="283" r:id="rId14"/>
+    <p:sldId id="268" r:id="rId15"/>
+    <p:sldId id="258" r:id="rId16"/>
   </p:sldIdLst>
   <p:sldSz cx="12192000" cy="6858000"/>
   <p:notesSz cx="6858000" cy="9144000"/>
@@ -2621,7 +2622,7 @@
           </a:ln>
           <a:extLst>
             <a:ext uri="{C572A759-6A51-4108-AA02-DFA0A04FC94B}">
-              <ma14:wrappingTextBoxFlag xmlns:ma14="http://schemas.microsoft.com/office/mac/drawingml/2011/main" xmlns:a14="http://schemas.microsoft.com/office/drawing/2010/main" xmlns:m="http://schemas.openxmlformats.org/officeDocument/2006/math" xmlns="" val="1"/>
+              <ma14:wrappingTextBoxFlag xmlns="" xmlns:m="http://schemas.openxmlformats.org/officeDocument/2006/math" xmlns:a14="http://schemas.microsoft.com/office/drawing/2010/main" xmlns:ma14="http://schemas.microsoft.com/office/mac/drawingml/2011/main" val="1"/>
             </a:ext>
           </a:extLst>
         </p:spPr>
@@ -2660,7 +2661,7 @@
           </a:ln>
           <a:extLst>
             <a:ext uri="{C572A759-6A51-4108-AA02-DFA0A04FC94B}">
-              <ma14:wrappingTextBoxFlag xmlns:ma14="http://schemas.microsoft.com/office/mac/drawingml/2011/main" xmlns:a14="http://schemas.microsoft.com/office/drawing/2010/main" xmlns:m="http://schemas.openxmlformats.org/officeDocument/2006/math" xmlns="" val="1"/>
+              <ma14:wrappingTextBoxFlag xmlns="" xmlns:m="http://schemas.openxmlformats.org/officeDocument/2006/math" xmlns:a14="http://schemas.microsoft.com/office/drawing/2010/main" xmlns:ma14="http://schemas.microsoft.com/office/mac/drawingml/2011/main" val="1"/>
             </a:ext>
           </a:extLst>
         </p:spPr>
@@ -3730,6 +3731,17 @@
               <a:t>Pressing harder makes it move faster</a:t>
             </a:r>
           </a:p>
+          <a:p>
+            <a:r>
+              <a:rPr lang="en-US" dirty="0"/>
+              <a:t>Attribution </a:t>
+            </a:r>
+            <a:r>
+              <a:rPr lang="en-US"/>
+              <a:t>of successes</a:t>
+            </a:r>
+            <a:endParaRPr lang="en-US" dirty="0"/>
+          </a:p>
         </p:txBody>
       </p:sp>
     </p:spTree>
@@ -3823,6 +3835,12 @@
               <a:t>Timing issues of direction change versus ADC settling</a:t>
             </a:r>
           </a:p>
+          <a:p>
+            <a:r>
+              <a:rPr lang="en-US" dirty="0"/>
+              <a:t>Explain what we tried for each of these</a:t>
+            </a:r>
+          </a:p>
         </p:txBody>
       </p:sp>
     </p:spTree>
@@ -3861,6 +3879,90 @@
           <p:cNvPr id="2" name="Title 1">
             <a:extLst>
               <a:ext uri="{FF2B5EF4-FFF2-40B4-BE49-F238E27FC236}">
+                <a16:creationId xmlns:a16="http://schemas.microsoft.com/office/drawing/2014/main" id="{FC71F7FD-AE76-32AE-D0DB-BCF998655A3E}"/>
+              </a:ext>
+            </a:extLst>
+          </p:cNvPr>
+          <p:cNvSpPr>
+            <a:spLocks noGrp="1"/>
+          </p:cNvSpPr>
+          <p:nvPr>
+            <p:ph type="title"/>
+          </p:nvPr>
+        </p:nvSpPr>
+        <p:spPr/>
+        <p:txBody>
+          <a:bodyPr/>
+          <a:lstStyle/>
+          <a:p>
+            <a:r>
+              <a:rPr lang="en-US" dirty="0"/>
+              <a:t>References</a:t>
+            </a:r>
+          </a:p>
+        </p:txBody>
+      </p:sp>
+      <p:sp>
+        <p:nvSpPr>
+          <p:cNvPr id="3" name="Text Placeholder 2">
+            <a:extLst>
+              <a:ext uri="{FF2B5EF4-FFF2-40B4-BE49-F238E27FC236}">
+                <a16:creationId xmlns:a16="http://schemas.microsoft.com/office/drawing/2014/main" id="{2B469654-7ACF-DA6E-229C-4698B439AC70}"/>
+              </a:ext>
+            </a:extLst>
+          </p:cNvPr>
+          <p:cNvSpPr>
+            <a:spLocks noGrp="1"/>
+          </p:cNvSpPr>
+          <p:nvPr>
+            <p:ph type="body" sz="half" idx="1"/>
+          </p:nvPr>
+        </p:nvSpPr>
+        <p:spPr/>
+        <p:txBody>
+          <a:bodyPr/>
+          <a:lstStyle/>
+          <a:p>
+            <a:endParaRPr lang="en-US" dirty="0"/>
+          </a:p>
+        </p:txBody>
+      </p:sp>
+    </p:spTree>
+    <p:extLst>
+      <p:ext uri="{BB962C8B-B14F-4D97-AF65-F5344CB8AC3E}">
+        <p14:creationId xmlns:p14="http://schemas.microsoft.com/office/powerpoint/2010/main" val="1905147005"/>
+      </p:ext>
+    </p:extLst>
+  </p:cSld>
+  <p:clrMapOvr>
+    <a:masterClrMapping/>
+  </p:clrMapOvr>
+  <p:transition spd="med"/>
+</p:sld>
+</file>
+
+<file path=ppt/slides/slide13.xml><?xml version="1.0" encoding="utf-8"?>
+<p:sld xmlns:a="http://schemas.openxmlformats.org/drawingml/2006/main" xmlns:r="http://schemas.openxmlformats.org/officeDocument/2006/relationships" xmlns:p="http://schemas.openxmlformats.org/presentationml/2006/main">
+  <p:cSld>
+    <p:spTree>
+      <p:nvGrpSpPr>
+        <p:cNvPr id="1" name=""/>
+        <p:cNvGrpSpPr/>
+        <p:nvPr/>
+      </p:nvGrpSpPr>
+      <p:grpSpPr>
+        <a:xfrm>
+          <a:off x="0" y="0"/>
+          <a:ext cx="0" cy="0"/>
+          <a:chOff x="0" y="0"/>
+          <a:chExt cx="0" cy="0"/>
+        </a:xfrm>
+      </p:grpSpPr>
+      <p:sp>
+        <p:nvSpPr>
+          <p:cNvPr id="2" name="Title 1">
+            <a:extLst>
+              <a:ext uri="{FF2B5EF4-FFF2-40B4-BE49-F238E27FC236}">
                 <a16:creationId xmlns:a16="http://schemas.microsoft.com/office/drawing/2014/main" id="{3D3FFB41-2A1F-4C77-A819-49497EA0DB02}"/>
               </a:ext>
             </a:extLst>
@@ -3898,7 +4000,7 @@
 </p:sld>
 </file>
 
-<file path=ppt/slides/slide13.xml><?xml version="1.0" encoding="utf-8"?>
+<file path=ppt/slides/slide14.xml><?xml version="1.0" encoding="utf-8"?>
 <p:sld xmlns:a="http://schemas.openxmlformats.org/drawingml/2006/main" xmlns:r="http://schemas.openxmlformats.org/officeDocument/2006/relationships" xmlns:p="http://schemas.openxmlformats.org/presentationml/2006/main">
   <p:cSld>
     <p:spTree>
@@ -4135,7 +4237,7 @@
 </p:sld>
 </file>
 
-<file path=ppt/slides/slide14.xml><?xml version="1.0" encoding="utf-8"?>
+<file path=ppt/slides/slide15.xml><?xml version="1.0" encoding="utf-8"?>
 <p:sld xmlns:a="http://schemas.openxmlformats.org/drawingml/2006/main" xmlns:r="http://schemas.openxmlformats.org/officeDocument/2006/relationships" xmlns:p="http://schemas.openxmlformats.org/presentationml/2006/main">
   <p:cSld>
     <p:spTree>
@@ -4740,6 +4842,12 @@
             </a:r>
           </a:p>
           <a:p>
+            <a:r>
+              <a:rPr lang="en-US" dirty="0"/>
+              <a:t>Make it clear which block we are in (visual in top corner)</a:t>
+            </a:r>
+          </a:p>
+          <a:p>
             <a:endParaRPr lang="en-US" dirty="0"/>
           </a:p>
         </p:txBody>
@@ -5153,6 +5261,12 @@
             <a:r>
               <a:rPr lang="en-US" dirty="0"/>
               <a:t>Explain DRP connection</a:t>
+            </a:r>
+          </a:p>
+          <a:p>
+            <a:r>
+              <a:rPr lang="en-US" dirty="0"/>
+              <a:t>Annotate code with simple comments of functionality</a:t>
             </a:r>
           </a:p>
         </p:txBody>

</xml_diff>

<commit_message>
Updated slides with more detail on ADC and FSR
</commit_message>
<xml_diff>
--- a/Bringing the Analog World to Digital Design_EC551_Final Project.pptx
+++ b/Bringing the Analog World to Digital Design_EC551_Final Project.pptx
@@ -5,7 +5,7 @@
     <p:sldMasterId id="2147483648" r:id="rId1"/>
   </p:sldMasterIdLst>
   <p:notesMasterIdLst>
-    <p:notesMasterId r:id="rId17"/>
+    <p:notesMasterId r:id="rId18"/>
   </p:notesMasterIdLst>
   <p:sldIdLst>
     <p:sldId id="256" r:id="rId2"/>
@@ -13,16 +13,17 @@
     <p:sldId id="274" r:id="rId4"/>
     <p:sldId id="275" r:id="rId5"/>
     <p:sldId id="276" r:id="rId6"/>
-    <p:sldId id="281" r:id="rId7"/>
-    <p:sldId id="282" r:id="rId8"/>
-    <p:sldId id="277" r:id="rId9"/>
-    <p:sldId id="278" r:id="rId10"/>
-    <p:sldId id="279" r:id="rId11"/>
-    <p:sldId id="280" r:id="rId12"/>
-    <p:sldId id="284" r:id="rId13"/>
-    <p:sldId id="283" r:id="rId14"/>
-    <p:sldId id="268" r:id="rId15"/>
-    <p:sldId id="258" r:id="rId16"/>
+    <p:sldId id="285" r:id="rId7"/>
+    <p:sldId id="281" r:id="rId8"/>
+    <p:sldId id="282" r:id="rId9"/>
+    <p:sldId id="277" r:id="rId10"/>
+    <p:sldId id="278" r:id="rId11"/>
+    <p:sldId id="279" r:id="rId12"/>
+    <p:sldId id="280" r:id="rId13"/>
+    <p:sldId id="284" r:id="rId14"/>
+    <p:sldId id="283" r:id="rId15"/>
+    <p:sldId id="268" r:id="rId16"/>
+    <p:sldId id="258" r:id="rId17"/>
   </p:sldIdLst>
   <p:sldSz cx="12192000" cy="6858000"/>
   <p:notesSz cx="6858000" cy="9144000"/>
@@ -2622,7 +2623,7 @@
           </a:ln>
           <a:extLst>
             <a:ext uri="{C572A759-6A51-4108-AA02-DFA0A04FC94B}">
-              <ma14:wrappingTextBoxFlag xmlns="" xmlns:m="http://schemas.openxmlformats.org/officeDocument/2006/math" xmlns:a14="http://schemas.microsoft.com/office/drawing/2010/main" xmlns:ma14="http://schemas.microsoft.com/office/mac/drawingml/2011/main" val="1"/>
+              <ma14:wrappingTextBoxFlag xmlns:ma14="http://schemas.microsoft.com/office/mac/drawingml/2011/main" xmlns:a14="http://schemas.microsoft.com/office/drawing/2010/main" xmlns:m="http://schemas.openxmlformats.org/officeDocument/2006/math" xmlns="" val="1"/>
             </a:ext>
           </a:extLst>
         </p:spPr>
@@ -2661,7 +2662,7 @@
           </a:ln>
           <a:extLst>
             <a:ext uri="{C572A759-6A51-4108-AA02-DFA0A04FC94B}">
-              <ma14:wrappingTextBoxFlag xmlns="" xmlns:m="http://schemas.openxmlformats.org/officeDocument/2006/math" xmlns:a14="http://schemas.microsoft.com/office/drawing/2010/main" xmlns:ma14="http://schemas.microsoft.com/office/mac/drawingml/2011/main" val="1"/>
+              <ma14:wrappingTextBoxFlag xmlns:ma14="http://schemas.microsoft.com/office/mac/drawingml/2011/main" xmlns:a14="http://schemas.microsoft.com/office/drawing/2010/main" xmlns:m="http://schemas.openxmlformats.org/officeDocument/2006/math" xmlns="" val="1"/>
             </a:ext>
           </a:extLst>
         </p:spPr>
@@ -3675,6 +3676,105 @@
           <p:cNvPr id="2" name="Title 1">
             <a:extLst>
               <a:ext uri="{FF2B5EF4-FFF2-40B4-BE49-F238E27FC236}">
+                <a16:creationId xmlns:a16="http://schemas.microsoft.com/office/drawing/2014/main" id="{200D8DF6-F784-4F6E-8355-DCA9B3C6A74C}"/>
+              </a:ext>
+            </a:extLst>
+          </p:cNvPr>
+          <p:cNvSpPr>
+            <a:spLocks noGrp="1"/>
+          </p:cNvSpPr>
+          <p:nvPr>
+            <p:ph type="title"/>
+          </p:nvPr>
+        </p:nvSpPr>
+        <p:spPr/>
+        <p:txBody>
+          <a:bodyPr/>
+          <a:lstStyle/>
+          <a:p>
+            <a:r>
+              <a:rPr lang="en-US" dirty="0"/>
+              <a:t>Verilog Example [Conor]</a:t>
+            </a:r>
+          </a:p>
+        </p:txBody>
+      </p:sp>
+      <p:sp>
+        <p:nvSpPr>
+          <p:cNvPr id="3" name="Text Placeholder 2">
+            <a:extLst>
+              <a:ext uri="{FF2B5EF4-FFF2-40B4-BE49-F238E27FC236}">
+                <a16:creationId xmlns:a16="http://schemas.microsoft.com/office/drawing/2014/main" id="{45B15F33-002C-459E-8BA3-897CD52D3A59}"/>
+              </a:ext>
+            </a:extLst>
+          </p:cNvPr>
+          <p:cNvSpPr>
+            <a:spLocks noGrp="1"/>
+          </p:cNvSpPr>
+          <p:nvPr>
+            <p:ph type="body" sz="half" idx="1"/>
+          </p:nvPr>
+        </p:nvSpPr>
+        <p:spPr/>
+        <p:txBody>
+          <a:bodyPr/>
+          <a:lstStyle/>
+          <a:p>
+            <a:r>
+              <a:rPr lang="en-US" dirty="0"/>
+              <a:t>ADC instantiation</a:t>
+            </a:r>
+          </a:p>
+          <a:p>
+            <a:r>
+              <a:rPr lang="en-US" dirty="0"/>
+              <a:t>Explain DRP connection</a:t>
+            </a:r>
+          </a:p>
+          <a:p>
+            <a:r>
+              <a:rPr lang="en-US" dirty="0"/>
+              <a:t>Annotate code with simple comments of functionality</a:t>
+            </a:r>
+          </a:p>
+        </p:txBody>
+      </p:sp>
+    </p:spTree>
+    <p:extLst>
+      <p:ext uri="{BB962C8B-B14F-4D97-AF65-F5344CB8AC3E}">
+        <p14:creationId xmlns:p14="http://schemas.microsoft.com/office/powerpoint/2010/main" val="2209896776"/>
+      </p:ext>
+    </p:extLst>
+  </p:cSld>
+  <p:clrMapOvr>
+    <a:masterClrMapping/>
+  </p:clrMapOvr>
+  <p:transition spd="med"/>
+</p:sld>
+</file>
+
+<file path=ppt/slides/slide11.xml><?xml version="1.0" encoding="utf-8"?>
+<p:sld xmlns:a="http://schemas.openxmlformats.org/drawingml/2006/main" xmlns:r="http://schemas.openxmlformats.org/officeDocument/2006/relationships" xmlns:p="http://schemas.openxmlformats.org/presentationml/2006/main">
+  <p:cSld>
+    <p:spTree>
+      <p:nvGrpSpPr>
+        <p:cNvPr id="1" name=""/>
+        <p:cNvGrpSpPr/>
+        <p:nvPr/>
+      </p:nvGrpSpPr>
+      <p:grpSpPr>
+        <a:xfrm>
+          <a:off x="0" y="0"/>
+          <a:ext cx="0" cy="0"/>
+          <a:chOff x="0" y="0"/>
+          <a:chExt cx="0" cy="0"/>
+        </a:xfrm>
+      </p:grpSpPr>
+      <p:sp>
+        <p:nvSpPr>
+          <p:cNvPr id="2" name="Title 1">
+            <a:extLst>
+              <a:ext uri="{FF2B5EF4-FFF2-40B4-BE49-F238E27FC236}">
                 <a16:creationId xmlns:a16="http://schemas.microsoft.com/office/drawing/2014/main" id="{18ADC116-86FE-4382-BFB0-2622ED23F9F2}"/>
               </a:ext>
             </a:extLst>
@@ -3758,7 +3858,7 @@
 </p:sld>
 </file>
 
-<file path=ppt/slides/slide11.xml><?xml version="1.0" encoding="utf-8"?>
+<file path=ppt/slides/slide12.xml><?xml version="1.0" encoding="utf-8"?>
 <p:sld xmlns:a="http://schemas.openxmlformats.org/drawingml/2006/main" xmlns:r="http://schemas.openxmlformats.org/officeDocument/2006/relationships" xmlns:p="http://schemas.openxmlformats.org/presentationml/2006/main">
   <p:cSld>
     <p:spTree>
@@ -3857,7 +3957,7 @@
 </p:sld>
 </file>
 
-<file path=ppt/slides/slide12.xml><?xml version="1.0" encoding="utf-8"?>
+<file path=ppt/slides/slide13.xml><?xml version="1.0" encoding="utf-8"?>
 <p:sld xmlns:a="http://schemas.openxmlformats.org/drawingml/2006/main" xmlns:r="http://schemas.openxmlformats.org/officeDocument/2006/relationships" xmlns:p="http://schemas.openxmlformats.org/presentationml/2006/main">
   <p:cSld>
     <p:spTree>
@@ -3941,7 +4041,7 @@
 </p:sld>
 </file>
 
-<file path=ppt/slides/slide13.xml><?xml version="1.0" encoding="utf-8"?>
+<file path=ppt/slides/slide14.xml><?xml version="1.0" encoding="utf-8"?>
 <p:sld xmlns:a="http://schemas.openxmlformats.org/drawingml/2006/main" xmlns:r="http://schemas.openxmlformats.org/officeDocument/2006/relationships" xmlns:p="http://schemas.openxmlformats.org/presentationml/2006/main">
   <p:cSld>
     <p:spTree>
@@ -4000,7 +4100,7 @@
 </p:sld>
 </file>
 
-<file path=ppt/slides/slide14.xml><?xml version="1.0" encoding="utf-8"?>
+<file path=ppt/slides/slide15.xml><?xml version="1.0" encoding="utf-8"?>
 <p:sld xmlns:a="http://schemas.openxmlformats.org/drawingml/2006/main" xmlns:r="http://schemas.openxmlformats.org/officeDocument/2006/relationships" xmlns:p="http://schemas.openxmlformats.org/presentationml/2006/main">
   <p:cSld>
     <p:spTree>
@@ -4237,7 +4337,7 @@
 </p:sld>
 </file>
 
-<file path=ppt/slides/slide15.xml><?xml version="1.0" encoding="utf-8"?>
+<file path=ppt/slides/slide16.xml><?xml version="1.0" encoding="utf-8"?>
 <p:sld xmlns:a="http://schemas.openxmlformats.org/drawingml/2006/main" xmlns:r="http://schemas.openxmlformats.org/officeDocument/2006/relationships" xmlns:p="http://schemas.openxmlformats.org/presentationml/2006/main">
   <p:cSld>
     <p:spTree>
@@ -4770,7 +4870,7 @@
         </p:spPr>
         <p:txBody>
           <a:bodyPr>
-            <a:normAutofit fontScale="92500"/>
+            <a:normAutofit fontScale="92500" lnSpcReduction="10000"/>
           </a:bodyPr>
           <a:lstStyle/>
           <a:p>
@@ -4798,6 +4898,13 @@
             <a:r>
               <a:rPr lang="en-US" dirty="0"/>
               <a:t>12 bit ADC</a:t>
+            </a:r>
+          </a:p>
+          <a:p>
+            <a:pPr lvl="2"/>
+            <a:r>
+              <a:rPr lang="en-US" dirty="0"/>
+              <a:t>4096 quantization levels</a:t>
             </a:r>
           </a:p>
           <a:p>
@@ -4918,7 +5025,7 @@
           <p:cNvPr id="2" name="Title 1">
             <a:extLst>
               <a:ext uri="{FF2B5EF4-FFF2-40B4-BE49-F238E27FC236}">
-                <a16:creationId xmlns:a16="http://schemas.microsoft.com/office/drawing/2014/main" id="{6809E014-24B6-4F26-82D2-8232BDF7B56E}"/>
+                <a16:creationId xmlns:a16="http://schemas.microsoft.com/office/drawing/2014/main" id="{9F0775CA-A2E5-A662-A70A-10994A9FBCA2}"/>
               </a:ext>
             </a:extLst>
           </p:cNvPr>
@@ -4931,12 +5038,14 @@
         </p:nvSpPr>
         <p:spPr/>
         <p:txBody>
-          <a:bodyPr/>
+          <a:bodyPr>
+            <a:normAutofit fontScale="90000"/>
+          </a:bodyPr>
           <a:lstStyle/>
           <a:p>
             <a:r>
               <a:rPr lang="en-US" dirty="0"/>
-              <a:t>Detailed Functionality-Game [Bin]</a:t>
+              <a:t>Detailed Functionality-Force Sensitive Resistor [Conor]</a:t>
             </a:r>
           </a:p>
         </p:txBody>
@@ -4946,7 +5055,7 @@
           <p:cNvPr id="3" name="Text Placeholder 2">
             <a:extLst>
               <a:ext uri="{FF2B5EF4-FFF2-40B4-BE49-F238E27FC236}">
-                <a16:creationId xmlns:a16="http://schemas.microsoft.com/office/drawing/2014/main" id="{DB267B4A-B026-46B7-9D6E-BC609B9CE301}"/>
+                <a16:creationId xmlns:a16="http://schemas.microsoft.com/office/drawing/2014/main" id="{336E9B22-A2C5-B2DD-9EFE-AF2163F005A4}"/>
               </a:ext>
             </a:extLst>
           </p:cNvPr>
@@ -4957,28 +5066,150 @@
             <p:ph type="body" sz="half" idx="1"/>
           </p:nvPr>
         </p:nvSpPr>
-        <p:spPr/>
+        <p:spPr>
+          <a:xfrm>
+            <a:off x="972600" y="2771832"/>
+            <a:ext cx="6981792" cy="3014802"/>
+          </a:xfrm>
+        </p:spPr>
         <p:txBody>
           <a:bodyPr/>
           <a:lstStyle/>
           <a:p>
             <a:r>
               <a:rPr lang="en-US" dirty="0"/>
-              <a:t>How did we change the game?</a:t>
+              <a:t>FSR is a material which changes its resistance when a force or pressure is applied.</a:t>
             </a:r>
           </a:p>
           <a:p>
             <a:r>
               <a:rPr lang="en-US" dirty="0"/>
-              <a:t>How do we use the output of the ADC</a:t>
+              <a:t>Composed by two substrate layers sandwiching together a conductive film and a spacer.</a:t>
+            </a:r>
+          </a:p>
+          <a:p>
+            <a:r>
+              <a:rPr lang="en-US" dirty="0"/>
+              <a:t>The substrate layer which is on the spacer side also has a conductive ink printed on it.</a:t>
+            </a:r>
+          </a:p>
+          <a:p>
+            <a:r>
+              <a:rPr lang="en-US" dirty="0"/>
+              <a:t>When force is applied to the sensor, the conductive film is deformed against the substrate and air is pushed out of the spacer causing the conductive film to come into contact with the conductive print on the substrate. The more of the conductive ink area touching the conductive film, the lower the resistance.</a:t>
             </a:r>
           </a:p>
         </p:txBody>
       </p:sp>
+      <p:sp>
+        <p:nvSpPr>
+          <p:cNvPr id="7" name="AutoShape 8" descr="A Wheatstone bridge has four resistors forming the sides of a diamond shape. A battery is connected across one pair of opposite corners, and a galvanometer across the other pair.">
+            <a:extLst>
+              <a:ext uri="{FF2B5EF4-FFF2-40B4-BE49-F238E27FC236}">
+                <a16:creationId xmlns:a16="http://schemas.microsoft.com/office/drawing/2014/main" id="{7778454C-7312-87A0-4AAB-EB215232D3DD}"/>
+              </a:ext>
+            </a:extLst>
+          </p:cNvPr>
+          <p:cNvSpPr>
+            <a:spLocks noChangeAspect="1" noChangeArrowheads="1"/>
+          </p:cNvSpPr>
+          <p:nvPr/>
+        </p:nvSpPr>
+        <p:spPr bwMode="auto">
+          <a:xfrm>
+            <a:off x="5943600" y="3276600"/>
+            <a:ext cx="304800" cy="304800"/>
+          </a:xfrm>
+          <a:prstGeom prst="rect">
+            <a:avLst/>
+          </a:prstGeom>
+          <a:noFill/>
+          <a:extLst>
+            <a:ext uri="{909E8E84-426E-40DD-AFC4-6F175D3DCCD1}">
+              <a14:hiddenFill xmlns:a14="http://schemas.microsoft.com/office/drawing/2010/main">
+                <a:solidFill>
+                  <a:srgbClr val="FFFFFF"/>
+                </a:solidFill>
+              </a14:hiddenFill>
+            </a:ext>
+          </a:extLst>
+        </p:spPr>
+        <p:txBody>
+          <a:bodyPr vert="horz" wrap="square" lIns="91440" tIns="45720" rIns="91440" bIns="45720" numCol="1" anchor="t" anchorCtr="0" compatLnSpc="1">
+            <a:prstTxWarp prst="textNoShape">
+              <a:avLst/>
+            </a:prstTxWarp>
+          </a:bodyPr>
+          <a:lstStyle/>
+          <a:p>
+            <a:endParaRPr lang="en-US"/>
+          </a:p>
+        </p:txBody>
+      </p:sp>
+      <p:pic>
+        <p:nvPicPr>
+          <p:cNvPr id="10" name="Picture 9">
+            <a:extLst>
+              <a:ext uri="{FF2B5EF4-FFF2-40B4-BE49-F238E27FC236}">
+                <a16:creationId xmlns:a16="http://schemas.microsoft.com/office/drawing/2014/main" id="{8EE8834F-8BEC-6E8E-8202-75C81CEBC811}"/>
+              </a:ext>
+            </a:extLst>
+          </p:cNvPr>
+          <p:cNvPicPr>
+            <a:picLocks noChangeAspect="1"/>
+          </p:cNvPicPr>
+          <p:nvPr/>
+        </p:nvPicPr>
+        <p:blipFill>
+          <a:blip r:embed="rId2"/>
+          <a:stretch>
+            <a:fillRect/>
+          </a:stretch>
+        </p:blipFill>
+        <p:spPr>
+          <a:xfrm>
+            <a:off x="9015051" y="3984067"/>
+            <a:ext cx="3062145" cy="2368442"/>
+          </a:xfrm>
+          <a:prstGeom prst="rect">
+            <a:avLst/>
+          </a:prstGeom>
+        </p:spPr>
+      </p:pic>
+      <p:pic>
+        <p:nvPicPr>
+          <p:cNvPr id="12" name="Picture 11">
+            <a:extLst>
+              <a:ext uri="{FF2B5EF4-FFF2-40B4-BE49-F238E27FC236}">
+                <a16:creationId xmlns:a16="http://schemas.microsoft.com/office/drawing/2014/main" id="{91A299DB-CC94-D732-CE5F-8EC6BBD8BD74}"/>
+              </a:ext>
+            </a:extLst>
+          </p:cNvPr>
+          <p:cNvPicPr>
+            <a:picLocks noChangeAspect="1"/>
+          </p:cNvPicPr>
+          <p:nvPr/>
+        </p:nvPicPr>
+        <p:blipFill>
+          <a:blip r:embed="rId3"/>
+          <a:stretch>
+            <a:fillRect/>
+          </a:stretch>
+        </p:blipFill>
+        <p:spPr>
+          <a:xfrm>
+            <a:off x="8335566" y="98764"/>
+            <a:ext cx="3741630" cy="3482636"/>
+          </a:xfrm>
+          <a:prstGeom prst="rect">
+            <a:avLst/>
+          </a:prstGeom>
+        </p:spPr>
+      </p:pic>
     </p:spTree>
     <p:extLst>
       <p:ext uri="{BB962C8B-B14F-4D97-AF65-F5344CB8AC3E}">
-        <p14:creationId xmlns:p14="http://schemas.microsoft.com/office/powerpoint/2010/main" val="528772889"/>
+        <p14:creationId xmlns:p14="http://schemas.microsoft.com/office/powerpoint/2010/main" val="10407439"/>
       </p:ext>
     </p:extLst>
   </p:cSld>
@@ -5029,15 +5260,7 @@
           <a:p>
             <a:r>
               <a:rPr lang="en-US" dirty="0"/>
-              <a:t>Detailed Functionality-Memory [</a:t>
-            </a:r>
-            <a:r>
-              <a:rPr lang="en-US" dirty="0" err="1"/>
-              <a:t>Yimin</a:t>
-            </a:r>
-            <a:r>
-              <a:rPr lang="en-US" dirty="0"/>
-              <a:t>] </a:t>
+              <a:t>Detailed Functionality-Game [Bin]</a:t>
             </a:r>
           </a:p>
         </p:txBody>
@@ -5065,6 +5288,107 @@
           <a:p>
             <a:r>
               <a:rPr lang="en-US" dirty="0"/>
+              <a:t>How did we change the game?</a:t>
+            </a:r>
+          </a:p>
+          <a:p>
+            <a:r>
+              <a:rPr lang="en-US" dirty="0"/>
+              <a:t>How do we use the output of the ADC</a:t>
+            </a:r>
+          </a:p>
+        </p:txBody>
+      </p:sp>
+    </p:spTree>
+    <p:extLst>
+      <p:ext uri="{BB962C8B-B14F-4D97-AF65-F5344CB8AC3E}">
+        <p14:creationId xmlns:p14="http://schemas.microsoft.com/office/powerpoint/2010/main" val="528772889"/>
+      </p:ext>
+    </p:extLst>
+  </p:cSld>
+  <p:clrMapOvr>
+    <a:masterClrMapping/>
+  </p:clrMapOvr>
+  <p:transition spd="med"/>
+</p:sld>
+</file>
+
+<file path=ppt/slides/slide8.xml><?xml version="1.0" encoding="utf-8"?>
+<p:sld xmlns:a="http://schemas.openxmlformats.org/drawingml/2006/main" xmlns:r="http://schemas.openxmlformats.org/officeDocument/2006/relationships" xmlns:p="http://schemas.openxmlformats.org/presentationml/2006/main">
+  <p:cSld>
+    <p:spTree>
+      <p:nvGrpSpPr>
+        <p:cNvPr id="1" name=""/>
+        <p:cNvGrpSpPr/>
+        <p:nvPr/>
+      </p:nvGrpSpPr>
+      <p:grpSpPr>
+        <a:xfrm>
+          <a:off x="0" y="0"/>
+          <a:ext cx="0" cy="0"/>
+          <a:chOff x="0" y="0"/>
+          <a:chExt cx="0" cy="0"/>
+        </a:xfrm>
+      </p:grpSpPr>
+      <p:sp>
+        <p:nvSpPr>
+          <p:cNvPr id="2" name="Title 1">
+            <a:extLst>
+              <a:ext uri="{FF2B5EF4-FFF2-40B4-BE49-F238E27FC236}">
+                <a16:creationId xmlns:a16="http://schemas.microsoft.com/office/drawing/2014/main" id="{6809E014-24B6-4F26-82D2-8232BDF7B56E}"/>
+              </a:ext>
+            </a:extLst>
+          </p:cNvPr>
+          <p:cNvSpPr>
+            <a:spLocks noGrp="1"/>
+          </p:cNvSpPr>
+          <p:nvPr>
+            <p:ph type="title"/>
+          </p:nvPr>
+        </p:nvSpPr>
+        <p:spPr/>
+        <p:txBody>
+          <a:bodyPr/>
+          <a:lstStyle/>
+          <a:p>
+            <a:r>
+              <a:rPr lang="en-US" dirty="0"/>
+              <a:t>Detailed Functionality-Memory [</a:t>
+            </a:r>
+            <a:r>
+              <a:rPr lang="en-US" dirty="0" err="1"/>
+              <a:t>Yimin</a:t>
+            </a:r>
+            <a:r>
+              <a:rPr lang="en-US" dirty="0"/>
+              <a:t>] </a:t>
+            </a:r>
+          </a:p>
+        </p:txBody>
+      </p:sp>
+      <p:sp>
+        <p:nvSpPr>
+          <p:cNvPr id="3" name="Text Placeholder 2">
+            <a:extLst>
+              <a:ext uri="{FF2B5EF4-FFF2-40B4-BE49-F238E27FC236}">
+                <a16:creationId xmlns:a16="http://schemas.microsoft.com/office/drawing/2014/main" id="{DB267B4A-B026-46B7-9D6E-BC609B9CE301}"/>
+              </a:ext>
+            </a:extLst>
+          </p:cNvPr>
+          <p:cNvSpPr>
+            <a:spLocks noGrp="1"/>
+          </p:cNvSpPr>
+          <p:nvPr>
+            <p:ph type="body" sz="half" idx="1"/>
+          </p:nvPr>
+        </p:nvSpPr>
+        <p:spPr/>
+        <p:txBody>
+          <a:bodyPr/>
+          <a:lstStyle/>
+          <a:p>
+            <a:r>
+              <a:rPr lang="en-US" dirty="0"/>
               <a:t>What were we planning on doing with the memory?</a:t>
             </a:r>
           </a:p>
@@ -5102,7 +5426,7 @@
 </p:sld>
 </file>
 
-<file path=ppt/slides/slide8.xml><?xml version="1.0" encoding="utf-8"?>
+<file path=ppt/slides/slide9.xml><?xml version="1.0" encoding="utf-8"?>
 <p:sld xmlns:a="http://schemas.openxmlformats.org/drawingml/2006/main" xmlns:r="http://schemas.openxmlformats.org/officeDocument/2006/relationships" xmlns:p="http://schemas.openxmlformats.org/presentationml/2006/main">
   <p:cSld>
     <p:spTree>
@@ -5176,105 +5500,6 @@
     <p:extLst>
       <p:ext uri="{BB962C8B-B14F-4D97-AF65-F5344CB8AC3E}">
         <p14:creationId xmlns:p14="http://schemas.microsoft.com/office/powerpoint/2010/main" val="3053318514"/>
-      </p:ext>
-    </p:extLst>
-  </p:cSld>
-  <p:clrMapOvr>
-    <a:masterClrMapping/>
-  </p:clrMapOvr>
-  <p:transition spd="med"/>
-</p:sld>
-</file>
-
-<file path=ppt/slides/slide9.xml><?xml version="1.0" encoding="utf-8"?>
-<p:sld xmlns:a="http://schemas.openxmlformats.org/drawingml/2006/main" xmlns:r="http://schemas.openxmlformats.org/officeDocument/2006/relationships" xmlns:p="http://schemas.openxmlformats.org/presentationml/2006/main">
-  <p:cSld>
-    <p:spTree>
-      <p:nvGrpSpPr>
-        <p:cNvPr id="1" name=""/>
-        <p:cNvGrpSpPr/>
-        <p:nvPr/>
-      </p:nvGrpSpPr>
-      <p:grpSpPr>
-        <a:xfrm>
-          <a:off x="0" y="0"/>
-          <a:ext cx="0" cy="0"/>
-          <a:chOff x="0" y="0"/>
-          <a:chExt cx="0" cy="0"/>
-        </a:xfrm>
-      </p:grpSpPr>
-      <p:sp>
-        <p:nvSpPr>
-          <p:cNvPr id="2" name="Title 1">
-            <a:extLst>
-              <a:ext uri="{FF2B5EF4-FFF2-40B4-BE49-F238E27FC236}">
-                <a16:creationId xmlns:a16="http://schemas.microsoft.com/office/drawing/2014/main" id="{200D8DF6-F784-4F6E-8355-DCA9B3C6A74C}"/>
-              </a:ext>
-            </a:extLst>
-          </p:cNvPr>
-          <p:cNvSpPr>
-            <a:spLocks noGrp="1"/>
-          </p:cNvSpPr>
-          <p:nvPr>
-            <p:ph type="title"/>
-          </p:nvPr>
-        </p:nvSpPr>
-        <p:spPr/>
-        <p:txBody>
-          <a:bodyPr/>
-          <a:lstStyle/>
-          <a:p>
-            <a:r>
-              <a:rPr lang="en-US" dirty="0"/>
-              <a:t>Verilog Example [Conor]</a:t>
-            </a:r>
-          </a:p>
-        </p:txBody>
-      </p:sp>
-      <p:sp>
-        <p:nvSpPr>
-          <p:cNvPr id="3" name="Text Placeholder 2">
-            <a:extLst>
-              <a:ext uri="{FF2B5EF4-FFF2-40B4-BE49-F238E27FC236}">
-                <a16:creationId xmlns:a16="http://schemas.microsoft.com/office/drawing/2014/main" id="{45B15F33-002C-459E-8BA3-897CD52D3A59}"/>
-              </a:ext>
-            </a:extLst>
-          </p:cNvPr>
-          <p:cNvSpPr>
-            <a:spLocks noGrp="1"/>
-          </p:cNvSpPr>
-          <p:nvPr>
-            <p:ph type="body" sz="half" idx="1"/>
-          </p:nvPr>
-        </p:nvSpPr>
-        <p:spPr/>
-        <p:txBody>
-          <a:bodyPr/>
-          <a:lstStyle/>
-          <a:p>
-            <a:r>
-              <a:rPr lang="en-US" dirty="0"/>
-              <a:t>ADC instantiation</a:t>
-            </a:r>
-          </a:p>
-          <a:p>
-            <a:r>
-              <a:rPr lang="en-US" dirty="0"/>
-              <a:t>Explain DRP connection</a:t>
-            </a:r>
-          </a:p>
-          <a:p>
-            <a:r>
-              <a:rPr lang="en-US" dirty="0"/>
-              <a:t>Annotate code with simple comments of functionality</a:t>
-            </a:r>
-          </a:p>
-        </p:txBody>
-      </p:sp>
-    </p:spTree>
-    <p:extLst>
-      <p:ext uri="{BB962C8B-B14F-4D97-AF65-F5344CB8AC3E}">
-        <p14:creationId xmlns:p14="http://schemas.microsoft.com/office/powerpoint/2010/main" val="2209896776"/>
       </p:ext>
     </p:extLst>
   </p:cSld>

</xml_diff>